<commit_message>
Amended slide #3 to remove load icon.
</commit_message>
<xml_diff>
--- a/docs/ui_spec_presentation/src/UISpecPresGroup20.pptx
+++ b/docs/ui_spec_presentation/src/UISpecPresGroup20.pptx
@@ -155,7 +155,7 @@
 <file path=ppt/revisionInfo.xml><?xml version="1.0" encoding="utf-8"?>
 <p1510:revInfo xmlns:a="http://schemas.openxmlformats.org/drawingml/2006/main" xmlns:r="http://schemas.openxmlformats.org/officeDocument/2006/relationships" xmlns:p1510="http://schemas.microsoft.com/office/powerpoint/2015/10/main">
   <p1510:revLst>
-    <p1510:client id="{C1985E81-5A62-47B6-B86B-8ADE75DFF93A}" v="46" dt="2020-05-05T13:00:49.675"/>
+    <p1510:client id="{C1985E81-5A62-47B6-B86B-8ADE75DFF93A}" v="47" dt="2020-05-05T13:28:39.392"/>
   </p1510:revLst>
 </p1510:revInfo>
 </file>
@@ -476,8 +476,8 @@
   </pc:docChgLst>
   <pc:docChgLst>
     <pc:chgData name="Nathaniel Watts" userId="b5f9068336b075df" providerId="LiveId" clId="{C1985E81-5A62-47B6-B86B-8ADE75DFF93A}"/>
-    <pc:docChg chg="custSel modSld">
-      <pc:chgData name="Nathaniel Watts" userId="b5f9068336b075df" providerId="LiveId" clId="{C1985E81-5A62-47B6-B86B-8ADE75DFF93A}" dt="2020-05-05T13:00:59.711" v="318" actId="14100"/>
+    <pc:docChg chg="undo custSel addSld delSld modSld">
+      <pc:chgData name="Nathaniel Watts" userId="b5f9068336b075df" providerId="LiveId" clId="{C1985E81-5A62-47B6-B86B-8ADE75DFF93A}" dt="2020-05-05T13:28:43.622" v="339" actId="171"/>
       <pc:docMkLst>
         <pc:docMk/>
       </pc:docMkLst>
@@ -512,14 +512,14 @@
           </ac:picMkLst>
         </pc:picChg>
       </pc:sldChg>
-      <pc:sldChg chg="addSp delSp modSp">
-        <pc:chgData name="Nathaniel Watts" userId="b5f9068336b075df" providerId="LiveId" clId="{C1985E81-5A62-47B6-B86B-8ADE75DFF93A}" dt="2020-05-05T12:08:27.628" v="25" actId="171"/>
+      <pc:sldChg chg="addSp delSp modSp add del">
+        <pc:chgData name="Nathaniel Watts" userId="b5f9068336b075df" providerId="LiveId" clId="{C1985E81-5A62-47B6-B86B-8ADE75DFF93A}" dt="2020-05-05T13:28:43.622" v="339" actId="171"/>
         <pc:sldMkLst>
           <pc:docMk/>
           <pc:sldMk cId="0" sldId="258"/>
         </pc:sldMkLst>
-        <pc:picChg chg="add mod ord">
-          <ac:chgData name="Nathaniel Watts" userId="b5f9068336b075df" providerId="LiveId" clId="{C1985E81-5A62-47B6-B86B-8ADE75DFF93A}" dt="2020-05-05T12:08:27.628" v="25" actId="171"/>
+        <pc:picChg chg="add del mod ord">
+          <ac:chgData name="Nathaniel Watts" userId="b5f9068336b075df" providerId="LiveId" clId="{C1985E81-5A62-47B6-B86B-8ADE75DFF93A}" dt="2020-05-05T13:28:36.812" v="321" actId="478"/>
           <ac:picMkLst>
             <pc:docMk/>
             <pc:sldMk cId="0" sldId="258"/>
@@ -532,6 +532,14 @@
             <pc:docMk/>
             <pc:sldMk cId="0" sldId="258"/>
             <ac:picMk id="4" creationId="{C7ABE8C2-36AC-4B44-94D2-8A95189799EB}"/>
+          </ac:picMkLst>
+        </pc:picChg>
+        <pc:picChg chg="add mod ord">
+          <ac:chgData name="Nathaniel Watts" userId="b5f9068336b075df" providerId="LiveId" clId="{C1985E81-5A62-47B6-B86B-8ADE75DFF93A}" dt="2020-05-05T13:28:43.622" v="339" actId="171"/>
+          <ac:picMkLst>
+            <pc:docMk/>
+            <pc:sldMk cId="0" sldId="258"/>
+            <ac:picMk id="4" creationId="{DD19CADE-B8DD-4783-819D-10BC6160006A}"/>
           </ac:picMkLst>
         </pc:picChg>
         <pc:picChg chg="del">
@@ -16150,10 +16158,10 @@
       </p:grpSpPr>
       <p:pic>
         <p:nvPicPr>
-          <p:cNvPr id="3" name="Picture 2" descr="A screenshot of a cell phone&#10;&#10;Description automatically generated">
+          <p:cNvPr id="4" name="Picture 3" descr="A screenshot of a cell phone&#10;&#10;Description automatically generated">
             <a:extLst>
               <a:ext uri="{FF2B5EF4-FFF2-40B4-BE49-F238E27FC236}">
-                <a16:creationId xmlns:a16="http://schemas.microsoft.com/office/drawing/2014/main" id="{BFC02D33-7F7D-4C9D-9E3F-8D3C6E3D1C53}"/>
+                <a16:creationId xmlns:a16="http://schemas.microsoft.com/office/drawing/2014/main" id="{DD19CADE-B8DD-4783-819D-10BC6160006A}"/>
               </a:ext>
             </a:extLst>
           </p:cNvPr>

</xml_diff>

<commit_message>
Reupload of correct file.
</commit_message>
<xml_diff>
--- a/docs/ui_spec_presentation/src/UISpecPresGroup20.pptx
+++ b/docs/ui_spec_presentation/src/UISpecPresGroup20.pptx
@@ -155,7 +155,7 @@
 <file path=ppt/revisionInfo.xml><?xml version="1.0" encoding="utf-8"?>
 <p1510:revInfo xmlns:a="http://schemas.openxmlformats.org/drawingml/2006/main" xmlns:r="http://schemas.openxmlformats.org/officeDocument/2006/relationships" xmlns:p1510="http://schemas.microsoft.com/office/powerpoint/2015/10/main">
   <p1510:revLst>
-    <p1510:client id="{C1985E81-5A62-47B6-B86B-8ADE75DFF93A}" v="47" dt="2020-05-05T13:28:39.392"/>
+    <p1510:client id="{C1985E81-5A62-47B6-B86B-8ADE75DFF93A}" v="51" dt="2020-05-05T13:47:08.034"/>
   </p1510:revLst>
 </p1510:revInfo>
 </file>
@@ -477,7 +477,7 @@
   <pc:docChgLst>
     <pc:chgData name="Nathaniel Watts" userId="b5f9068336b075df" providerId="LiveId" clId="{C1985E81-5A62-47B6-B86B-8ADE75DFF93A}"/>
     <pc:docChg chg="undo custSel addSld delSld modSld">
-      <pc:chgData name="Nathaniel Watts" userId="b5f9068336b075df" providerId="LiveId" clId="{C1985E81-5A62-47B6-B86B-8ADE75DFF93A}" dt="2020-05-05T13:28:43.622" v="339" actId="171"/>
+      <pc:chgData name="Nathaniel Watts" userId="b5f9068336b075df" providerId="LiveId" clId="{C1985E81-5A62-47B6-B86B-8ADE75DFF93A}" dt="2020-05-05T13:47:12.445" v="388" actId="171"/>
       <pc:docMkLst>
         <pc:docMk/>
       </pc:docMkLst>
@@ -724,17 +724,25 @@
         </pc:picChg>
       </pc:sldChg>
       <pc:sldChg chg="addSp delSp modSp">
-        <pc:chgData name="Nathaniel Watts" userId="b5f9068336b075df" providerId="LiveId" clId="{C1985E81-5A62-47B6-B86B-8ADE75DFF93A}" dt="2020-05-05T12:51:08.190" v="269"/>
+        <pc:chgData name="Nathaniel Watts" userId="b5f9068336b075df" providerId="LiveId" clId="{C1985E81-5A62-47B6-B86B-8ADE75DFF93A}" dt="2020-05-05T13:46:14.294" v="354" actId="171"/>
         <pc:sldMkLst>
           <pc:docMk/>
           <pc:sldMk cId="0" sldId="263"/>
         </pc:sldMkLst>
-        <pc:picChg chg="add mod ord">
-          <ac:chgData name="Nathaniel Watts" userId="b5f9068336b075df" providerId="LiveId" clId="{C1985E81-5A62-47B6-B86B-8ADE75DFF93A}" dt="2020-05-05T12:09:35.255" v="142" actId="171"/>
+        <pc:picChg chg="add del mod ord">
+          <ac:chgData name="Nathaniel Watts" userId="b5f9068336b075df" providerId="LiveId" clId="{C1985E81-5A62-47B6-B86B-8ADE75DFF93A}" dt="2020-05-05T13:46:07.089" v="340" actId="478"/>
           <ac:picMkLst>
             <pc:docMk/>
             <pc:sldMk cId="0" sldId="263"/>
             <ac:picMk id="3" creationId="{240476AF-85B4-4CCB-BA59-9EEA823792D3}"/>
+          </ac:picMkLst>
+        </pc:picChg>
+        <pc:picChg chg="add mod ord">
+          <ac:chgData name="Nathaniel Watts" userId="b5f9068336b075df" providerId="LiveId" clId="{C1985E81-5A62-47B6-B86B-8ADE75DFF93A}" dt="2020-05-05T13:46:14.294" v="354" actId="171"/>
+          <ac:picMkLst>
+            <pc:docMk/>
+            <pc:sldMk cId="0" sldId="263"/>
+            <ac:picMk id="4" creationId="{BF827444-F351-496F-91A9-ED80D0FED14C}"/>
           </ac:picMkLst>
         </pc:picChg>
         <pc:picChg chg="add">
@@ -770,12 +778,28 @@
           </ac:picMkLst>
         </pc:picChg>
       </pc:sldChg>
-      <pc:sldChg chg="addSp">
-        <pc:chgData name="Nathaniel Watts" userId="b5f9068336b075df" providerId="LiveId" clId="{C1985E81-5A62-47B6-B86B-8ADE75DFF93A}" dt="2020-05-05T12:51:09.655" v="270"/>
+      <pc:sldChg chg="addSp delSp modSp">
+        <pc:chgData name="Nathaniel Watts" userId="b5f9068336b075df" providerId="LiveId" clId="{C1985E81-5A62-47B6-B86B-8ADE75DFF93A}" dt="2020-05-05T13:46:52.989" v="371" actId="478"/>
         <pc:sldMkLst>
           <pc:docMk/>
           <pc:sldMk cId="0" sldId="264"/>
         </pc:sldMkLst>
+        <pc:picChg chg="add mod ord">
+          <ac:chgData name="Nathaniel Watts" userId="b5f9068336b075df" providerId="LiveId" clId="{C1985E81-5A62-47B6-B86B-8ADE75DFF93A}" dt="2020-05-05T13:46:27.162" v="367" actId="171"/>
+          <ac:picMkLst>
+            <pc:docMk/>
+            <pc:sldMk cId="0" sldId="264"/>
+            <ac:picMk id="3" creationId="{F4DB4B9A-5AFB-4484-A6A3-9FD95AAD16CF}"/>
+          </ac:picMkLst>
+        </pc:picChg>
+        <pc:picChg chg="del">
+          <ac:chgData name="Nathaniel Watts" userId="b5f9068336b075df" providerId="LiveId" clId="{C1985E81-5A62-47B6-B86B-8ADE75DFF93A}" dt="2020-05-05T13:46:46.870" v="368" actId="478"/>
+          <ac:picMkLst>
+            <pc:docMk/>
+            <pc:sldMk cId="0" sldId="264"/>
+            <ac:picMk id="4" creationId="{773FF338-AC1F-43D1-8047-6C11E1E19795}"/>
+          </ac:picMkLst>
+        </pc:picChg>
         <pc:picChg chg="add">
           <ac:chgData name="Nathaniel Watts" userId="b5f9068336b075df" providerId="LiveId" clId="{C1985E81-5A62-47B6-B86B-8ADE75DFF93A}" dt="2020-05-05T12:51:09.655" v="270"/>
           <ac:picMkLst>
@@ -784,19 +808,43 @@
             <ac:picMk id="5" creationId="{05752AA4-09E0-44FC-BDDF-84CC1426D277}"/>
           </ac:picMkLst>
         </pc:picChg>
+        <pc:picChg chg="add del mod">
+          <ac:chgData name="Nathaniel Watts" userId="b5f9068336b075df" providerId="LiveId" clId="{C1985E81-5A62-47B6-B86B-8ADE75DFF93A}" dt="2020-05-05T13:46:52.989" v="371" actId="478"/>
+          <ac:picMkLst>
+            <pc:docMk/>
+            <pc:sldMk cId="0" sldId="264"/>
+            <ac:picMk id="8" creationId="{A5E6C032-691D-4D78-A242-E686E24B6335}"/>
+          </ac:picMkLst>
+        </pc:picChg>
       </pc:sldChg>
-      <pc:sldChg chg="addSp">
-        <pc:chgData name="Nathaniel Watts" userId="b5f9068336b075df" providerId="LiveId" clId="{C1985E81-5A62-47B6-B86B-8ADE75DFF93A}" dt="2020-05-05T12:51:11.095" v="271"/>
+      <pc:sldChg chg="addSp delSp modSp">
+        <pc:chgData name="Nathaniel Watts" userId="b5f9068336b075df" providerId="LiveId" clId="{C1985E81-5A62-47B6-B86B-8ADE75DFF93A}" dt="2020-05-05T13:47:12.445" v="388" actId="171"/>
         <pc:sldMkLst>
           <pc:docMk/>
           <pc:sldMk cId="0" sldId="265"/>
         </pc:sldMkLst>
+        <pc:picChg chg="del">
+          <ac:chgData name="Nathaniel Watts" userId="b5f9068336b075df" providerId="LiveId" clId="{C1985E81-5A62-47B6-B86B-8ADE75DFF93A}" dt="2020-05-05T13:47:07.670" v="372" actId="478"/>
+          <ac:picMkLst>
+            <pc:docMk/>
+            <pc:sldMk cId="0" sldId="265"/>
+            <ac:picMk id="4" creationId="{FE8E5AA5-EED6-4AEB-B45D-CC8D85FE7649}"/>
+          </ac:picMkLst>
+        </pc:picChg>
         <pc:picChg chg="add">
           <ac:chgData name="Nathaniel Watts" userId="b5f9068336b075df" providerId="LiveId" clId="{C1985E81-5A62-47B6-B86B-8ADE75DFF93A}" dt="2020-05-05T12:51:11.095" v="271"/>
           <ac:picMkLst>
             <pc:docMk/>
             <pc:sldMk cId="0" sldId="265"/>
             <ac:picMk id="6" creationId="{AC605F20-BAEF-4FC8-B700-0B4B26A59980}"/>
+          </ac:picMkLst>
+        </pc:picChg>
+        <pc:picChg chg="add ord">
+          <ac:chgData name="Nathaniel Watts" userId="b5f9068336b075df" providerId="LiveId" clId="{C1985E81-5A62-47B6-B86B-8ADE75DFF93A}" dt="2020-05-05T13:47:12.445" v="388" actId="171"/>
+          <ac:picMkLst>
+            <pc:docMk/>
+            <pc:sldMk cId="0" sldId="265"/>
+            <ac:picMk id="7" creationId="{CEA1F5CC-6E82-452C-BF7F-A534B5E0F433}"/>
           </ac:picMkLst>
         </pc:picChg>
       </pc:sldChg>
@@ -5714,10 +5762,10 @@
       </p:grpSpPr>
       <p:pic>
         <p:nvPicPr>
-          <p:cNvPr id="4" name="Picture 3" descr="A screenshot of a cell phone&#10;&#10;Description automatically generated">
+          <p:cNvPr id="7" name="Picture 6" descr="A screenshot of a cell phone&#10;&#10;Description automatically generated">
             <a:extLst>
               <a:ext uri="{FF2B5EF4-FFF2-40B4-BE49-F238E27FC236}">
-                <a16:creationId xmlns:a16="http://schemas.microsoft.com/office/drawing/2014/main" id="{FE8E5AA5-EED6-4AEB-B45D-CC8D85FE7649}"/>
+                <a16:creationId xmlns:a16="http://schemas.microsoft.com/office/drawing/2014/main" id="{CEA1F5CC-6E82-452C-BF7F-A534B5E0F433}"/>
               </a:ext>
             </a:extLst>
           </p:cNvPr>
@@ -20255,10 +20303,10 @@
       </p:grpSpPr>
       <p:pic>
         <p:nvPicPr>
-          <p:cNvPr id="3" name="Picture 2" descr="A screenshot of a cell phone&#10;&#10;Description automatically generated">
+          <p:cNvPr id="4" name="Picture 3" descr="A screenshot of a cell phone&#10;&#10;Description automatically generated">
             <a:extLst>
               <a:ext uri="{FF2B5EF4-FFF2-40B4-BE49-F238E27FC236}">
-                <a16:creationId xmlns:a16="http://schemas.microsoft.com/office/drawing/2014/main" id="{240476AF-85B4-4CCB-BA59-9EEA823792D3}"/>
+                <a16:creationId xmlns:a16="http://schemas.microsoft.com/office/drawing/2014/main" id="{BF827444-F351-496F-91A9-ED80D0FED14C}"/>
               </a:ext>
             </a:extLst>
           </p:cNvPr>
@@ -20508,10 +20556,10 @@
       </p:grpSpPr>
       <p:pic>
         <p:nvPicPr>
-          <p:cNvPr id="4" name="Picture 3" descr="A screenshot of a cell phone&#10;&#10;Description automatically generated">
+          <p:cNvPr id="3" name="Picture 2" descr="A screenshot of a cell phone&#10;&#10;Description automatically generated">
             <a:extLst>
               <a:ext uri="{FF2B5EF4-FFF2-40B4-BE49-F238E27FC236}">
-                <a16:creationId xmlns:a16="http://schemas.microsoft.com/office/drawing/2014/main" id="{773FF338-AC1F-43D1-8047-6C11E1E19795}"/>
+                <a16:creationId xmlns:a16="http://schemas.microsoft.com/office/drawing/2014/main" id="{F4DB4B9A-5AFB-4484-A6A3-9FD95AAD16CF}"/>
               </a:ext>
             </a:extLst>
           </p:cNvPr>

</xml_diff>

<commit_message>
Amended third to last slide to remove load icon.
</commit_message>
<xml_diff>
--- a/docs/ui_spec_presentation/src/UISpecPresGroup20.pptx
+++ b/docs/ui_spec_presentation/src/UISpecPresGroup20.pptx
@@ -155,7 +155,7 @@
 <file path=ppt/revisionInfo.xml><?xml version="1.0" encoding="utf-8"?>
 <p1510:revInfo xmlns:a="http://schemas.openxmlformats.org/drawingml/2006/main" xmlns:r="http://schemas.openxmlformats.org/officeDocument/2006/relationships" xmlns:p1510="http://schemas.microsoft.com/office/powerpoint/2015/10/main">
   <p1510:revLst>
-    <p1510:client id="{C1985E81-5A62-47B6-B86B-8ADE75DFF93A}" v="51" dt="2020-05-05T13:47:08.034"/>
+    <p1510:client id="{C1985E81-5A62-47B6-B86B-8ADE75DFF93A}" v="55" dt="2020-05-05T13:51:19.226"/>
   </p1510:revLst>
 </p1510:revInfo>
 </file>
@@ -477,7 +477,7 @@
   <pc:docChgLst>
     <pc:chgData name="Nathaniel Watts" userId="b5f9068336b075df" providerId="LiveId" clId="{C1985E81-5A62-47B6-B86B-8ADE75DFF93A}"/>
     <pc:docChg chg="undo custSel addSld delSld modSld">
-      <pc:chgData name="Nathaniel Watts" userId="b5f9068336b075df" providerId="LiveId" clId="{C1985E81-5A62-47B6-B86B-8ADE75DFF93A}" dt="2020-05-05T13:47:12.445" v="388" actId="171"/>
+      <pc:chgData name="Nathaniel Watts" userId="b5f9068336b075df" providerId="LiveId" clId="{C1985E81-5A62-47B6-B86B-8ADE75DFF93A}" dt="2020-05-05T13:51:19.226" v="392"/>
       <pc:docMkLst>
         <pc:docMk/>
       </pc:docMkLst>
@@ -1085,7 +1085,7 @@
         </pc:picChg>
       </pc:sldChg>
       <pc:sldChg chg="addSp delSp modSp">
-        <pc:chgData name="Nathaniel Watts" userId="b5f9068336b075df" providerId="LiveId" clId="{C1985E81-5A62-47B6-B86B-8ADE75DFF93A}" dt="2020-05-05T12:10:03.169" v="173" actId="171"/>
+        <pc:chgData name="Nathaniel Watts" userId="b5f9068336b075df" providerId="LiveId" clId="{C1985E81-5A62-47B6-B86B-8ADE75DFF93A}" dt="2020-05-05T13:50:04.274" v="389"/>
         <pc:sldMkLst>
           <pc:docMk/>
           <pc:sldMk cId="0" sldId="290"/>
@@ -1106,9 +1106,17 @@
             <ac:picMk id="4" creationId="{6E5574D0-5CF6-4885-AC58-117D4E868A94}"/>
           </ac:picMkLst>
         </pc:picChg>
+        <pc:picChg chg="add">
+          <ac:chgData name="Nathaniel Watts" userId="b5f9068336b075df" providerId="LiveId" clId="{C1985E81-5A62-47B6-B86B-8ADE75DFF93A}" dt="2020-05-05T13:50:04.274" v="389"/>
+          <ac:picMkLst>
+            <pc:docMk/>
+            <pc:sldMk cId="0" sldId="290"/>
+            <ac:picMk id="6" creationId="{53483620-1BD4-4510-A157-88541270441A}"/>
+          </ac:picMkLst>
+        </pc:picChg>
       </pc:sldChg>
       <pc:sldChg chg="addSp delSp modSp">
-        <pc:chgData name="Nathaniel Watts" userId="b5f9068336b075df" providerId="LiveId" clId="{C1985E81-5A62-47B6-B86B-8ADE75DFF93A}" dt="2020-05-05T12:10:11.573" v="193" actId="171"/>
+        <pc:chgData name="Nathaniel Watts" userId="b5f9068336b075df" providerId="LiveId" clId="{C1985E81-5A62-47B6-B86B-8ADE75DFF93A}" dt="2020-05-05T13:51:19.226" v="392"/>
         <pc:sldMkLst>
           <pc:docMk/>
           <pc:sldMk cId="0" sldId="291"/>
@@ -1129,9 +1137,17 @@
             <ac:picMk id="4" creationId="{736B4737-B996-4CDB-A40C-DB00F31B8890}"/>
           </ac:picMkLst>
         </pc:picChg>
+        <pc:picChg chg="add">
+          <ac:chgData name="Nathaniel Watts" userId="b5f9068336b075df" providerId="LiveId" clId="{C1985E81-5A62-47B6-B86B-8ADE75DFF93A}" dt="2020-05-05T13:51:19.226" v="392"/>
+          <ac:picMkLst>
+            <pc:docMk/>
+            <pc:sldMk cId="0" sldId="291"/>
+            <ac:picMk id="6" creationId="{CAD5B14B-E2E9-4CE3-8391-B0CFDF68D21A}"/>
+          </ac:picMkLst>
+        </pc:picChg>
       </pc:sldChg>
       <pc:sldChg chg="addSp delSp modSp">
-        <pc:chgData name="Nathaniel Watts" userId="b5f9068336b075df" providerId="LiveId" clId="{C1985E81-5A62-47B6-B86B-8ADE75DFF93A}" dt="2020-05-05T12:10:21.599" v="212" actId="171"/>
+        <pc:chgData name="Nathaniel Watts" userId="b5f9068336b075df" providerId="LiveId" clId="{C1985E81-5A62-47B6-B86B-8ADE75DFF93A}" dt="2020-05-05T13:50:06.451" v="390"/>
         <pc:sldMkLst>
           <pc:docMk/>
           <pc:sldMk cId="0" sldId="292"/>
@@ -1152,9 +1168,17 @@
             <ac:picMk id="4" creationId="{5744DCF0-2526-4AEF-8423-6FCB538DFBBF}"/>
           </ac:picMkLst>
         </pc:picChg>
+        <pc:picChg chg="add">
+          <ac:chgData name="Nathaniel Watts" userId="b5f9068336b075df" providerId="LiveId" clId="{C1985E81-5A62-47B6-B86B-8ADE75DFF93A}" dt="2020-05-05T13:50:06.451" v="390"/>
+          <ac:picMkLst>
+            <pc:docMk/>
+            <pc:sldMk cId="0" sldId="292"/>
+            <ac:picMk id="6" creationId="{499A5F98-0FF8-4747-B1D5-90CA6AC36BA4}"/>
+          </ac:picMkLst>
+        </pc:picChg>
       </pc:sldChg>
       <pc:sldChg chg="addSp delSp modSp">
-        <pc:chgData name="Nathaniel Watts" userId="b5f9068336b075df" providerId="LiveId" clId="{C1985E81-5A62-47B6-B86B-8ADE75DFF93A}" dt="2020-05-05T12:11:26.992" v="245" actId="1038"/>
+        <pc:chgData name="Nathaniel Watts" userId="b5f9068336b075df" providerId="LiveId" clId="{C1985E81-5A62-47B6-B86B-8ADE75DFF93A}" dt="2020-05-05T13:50:08.625" v="391"/>
         <pc:sldMkLst>
           <pc:docMk/>
           <pc:sldMk cId="0" sldId="293"/>
@@ -1181,6 +1205,14 @@
             <pc:docMk/>
             <pc:sldMk cId="0" sldId="293"/>
             <ac:picMk id="6" creationId="{995D3862-FBE2-446C-9DE6-D732C4FCAF25}"/>
+          </ac:picMkLst>
+        </pc:picChg>
+        <pc:picChg chg="add">
+          <ac:chgData name="Nathaniel Watts" userId="b5f9068336b075df" providerId="LiveId" clId="{C1985E81-5A62-47B6-B86B-8ADE75DFF93A}" dt="2020-05-05T13:50:08.625" v="391"/>
+          <ac:picMkLst>
+            <pc:docMk/>
+            <pc:sldMk cId="0" sldId="293"/>
+            <ac:picMk id="7" creationId="{4CAB1660-CB4F-4DC2-957D-EEB5CF06D0B7}"/>
           </ac:picMkLst>
         </pc:picChg>
         <pc:picChg chg="add mod ord">
@@ -18121,6 +18153,35 @@
           <a:fontRef idx="minor"/>
         </p:style>
       </p:sp>
+      <p:pic>
+        <p:nvPicPr>
+          <p:cNvPr id="6" name="Picture 5">
+            <a:extLst>
+              <a:ext uri="{FF2B5EF4-FFF2-40B4-BE49-F238E27FC236}">
+                <a16:creationId xmlns:a16="http://schemas.microsoft.com/office/drawing/2014/main" id="{53483620-1BD4-4510-A157-88541270441A}"/>
+              </a:ext>
+            </a:extLst>
+          </p:cNvPr>
+          <p:cNvPicPr/>
+          <p:nvPr/>
+        </p:nvPicPr>
+        <p:blipFill>
+          <a:blip r:embed="rId3"/>
+          <a:stretch/>
+        </p:blipFill>
+        <p:spPr>
+          <a:xfrm>
+            <a:off x="0" y="0"/>
+            <a:ext cx="513720" cy="5146920"/>
+          </a:xfrm>
+          <a:prstGeom prst="rect">
+            <a:avLst/>
+          </a:prstGeom>
+          <a:ln>
+            <a:noFill/>
+          </a:ln>
+        </p:spPr>
+      </p:pic>
     </p:spTree>
   </p:cSld>
   <p:clrMapOvr>
@@ -18344,6 +18405,35 @@
           <a:fontRef idx="minor"/>
         </p:style>
       </p:sp>
+      <p:pic>
+        <p:nvPicPr>
+          <p:cNvPr id="6" name="Picture 5">
+            <a:extLst>
+              <a:ext uri="{FF2B5EF4-FFF2-40B4-BE49-F238E27FC236}">
+                <a16:creationId xmlns:a16="http://schemas.microsoft.com/office/drawing/2014/main" id="{CAD5B14B-E2E9-4CE3-8391-B0CFDF68D21A}"/>
+              </a:ext>
+            </a:extLst>
+          </p:cNvPr>
+          <p:cNvPicPr/>
+          <p:nvPr/>
+        </p:nvPicPr>
+        <p:blipFill>
+          <a:blip r:embed="rId3"/>
+          <a:stretch/>
+        </p:blipFill>
+        <p:spPr>
+          <a:xfrm>
+            <a:off x="0" y="0"/>
+            <a:ext cx="513720" cy="5146920"/>
+          </a:xfrm>
+          <a:prstGeom prst="rect">
+            <a:avLst/>
+          </a:prstGeom>
+          <a:ln>
+            <a:noFill/>
+          </a:ln>
+        </p:spPr>
+      </p:pic>
     </p:spTree>
   </p:cSld>
   <p:clrMapOvr>
@@ -18567,6 +18657,35 @@
           <a:fontRef idx="minor"/>
         </p:style>
       </p:sp>
+      <p:pic>
+        <p:nvPicPr>
+          <p:cNvPr id="6" name="Picture 5">
+            <a:extLst>
+              <a:ext uri="{FF2B5EF4-FFF2-40B4-BE49-F238E27FC236}">
+                <a16:creationId xmlns:a16="http://schemas.microsoft.com/office/drawing/2014/main" id="{499A5F98-0FF8-4747-B1D5-90CA6AC36BA4}"/>
+              </a:ext>
+            </a:extLst>
+          </p:cNvPr>
+          <p:cNvPicPr/>
+          <p:nvPr/>
+        </p:nvPicPr>
+        <p:blipFill>
+          <a:blip r:embed="rId3"/>
+          <a:stretch/>
+        </p:blipFill>
+        <p:spPr>
+          <a:xfrm>
+            <a:off x="0" y="0"/>
+            <a:ext cx="513720" cy="5146920"/>
+          </a:xfrm>
+          <a:prstGeom prst="rect">
+            <a:avLst/>
+          </a:prstGeom>
+          <a:ln>
+            <a:noFill/>
+          </a:ln>
+        </p:spPr>
+      </p:pic>
     </p:spTree>
   </p:cSld>
   <p:clrMapOvr>
@@ -18812,6 +18931,35 @@
           <a:prstGeom prst="rect">
             <a:avLst/>
           </a:prstGeom>
+        </p:spPr>
+      </p:pic>
+      <p:pic>
+        <p:nvPicPr>
+          <p:cNvPr id="7" name="Picture 6">
+            <a:extLst>
+              <a:ext uri="{FF2B5EF4-FFF2-40B4-BE49-F238E27FC236}">
+                <a16:creationId xmlns:a16="http://schemas.microsoft.com/office/drawing/2014/main" id="{4CAB1660-CB4F-4DC2-957D-EEB5CF06D0B7}"/>
+              </a:ext>
+            </a:extLst>
+          </p:cNvPr>
+          <p:cNvPicPr/>
+          <p:nvPr/>
+        </p:nvPicPr>
+        <p:blipFill>
+          <a:blip r:embed="rId3"/>
+          <a:stretch/>
+        </p:blipFill>
+        <p:spPr>
+          <a:xfrm>
+            <a:off x="0" y="0"/>
+            <a:ext cx="513720" cy="5146920"/>
+          </a:xfrm>
+          <a:prstGeom prst="rect">
+            <a:avLst/>
+          </a:prstGeom>
+          <a:ln>
+            <a:noFill/>
+          </a:ln>
         </p:spPr>
       </p:pic>
     </p:spTree>

</xml_diff>